<commit_message>
add e-mail address to ppt
ppt 파일 내에 e-mail 주소 추가하였습니다.
</commit_message>
<xml_diff>
--- a/Venv를 통한 가상 환경.pptx
+++ b/Venv를 통한 가상 환경.pptx
@@ -5,10 +5,10 @@
     <p:sldMasterId id="2147483648" r:id="rId4"/>
   </p:sldMasterIdLst>
   <p:notesMasterIdLst>
-    <p:notesMasterId r:id="rId12"/>
+    <p:notesMasterId r:id="rId13"/>
   </p:notesMasterIdLst>
   <p:handoutMasterIdLst>
-    <p:handoutMasterId r:id="rId13"/>
+    <p:handoutMasterId r:id="rId14"/>
   </p:handoutMasterIdLst>
   <p:sldIdLst>
     <p:sldId id="256" r:id="rId5"/>
@@ -18,6 +18,7 @@
     <p:sldId id="293" r:id="rId9"/>
     <p:sldId id="294" r:id="rId10"/>
     <p:sldId id="295" r:id="rId11"/>
+    <p:sldId id="296" r:id="rId12"/>
   </p:sldIdLst>
   <p:sldSz cx="12192000" cy="6858000"/>
   <p:notesSz cx="6858000" cy="9144000"/>
@@ -12200,6 +12201,117 @@
     <p:extLst>
       <p:ext uri="{BB962C8B-B14F-4D97-AF65-F5344CB8AC3E}">
         <p14:creationId xmlns:p14="http://schemas.microsoft.com/office/powerpoint/2010/main" val="1053728518"/>
+      </p:ext>
+    </p:extLst>
+  </p:cSld>
+  <p:clrMapOvr>
+    <a:masterClrMapping/>
+  </p:clrMapOvr>
+</p:sld>
+</file>
+
+<file path=ppt/slides/slide8.xml><?xml version="1.0" encoding="utf-8"?>
+<p:sld xmlns:a="http://schemas.openxmlformats.org/drawingml/2006/main" xmlns:r="http://schemas.openxmlformats.org/officeDocument/2006/relationships" xmlns:p="http://schemas.openxmlformats.org/presentationml/2006/main">
+  <p:cSld>
+    <p:spTree>
+      <p:nvGrpSpPr>
+        <p:cNvPr id="1" name=""/>
+        <p:cNvGrpSpPr/>
+        <p:nvPr/>
+      </p:nvGrpSpPr>
+      <p:grpSpPr>
+        <a:xfrm>
+          <a:off x="0" y="0"/>
+          <a:ext cx="0" cy="0"/>
+          <a:chOff x="0" y="0"/>
+          <a:chExt cx="0" cy="0"/>
+        </a:xfrm>
+      </p:grpSpPr>
+      <p:sp>
+        <p:nvSpPr>
+          <p:cNvPr id="2" name="제목 1">
+            <a:extLst>
+              <a:ext uri="{FF2B5EF4-FFF2-40B4-BE49-F238E27FC236}">
+                <a16:creationId xmlns:a16="http://schemas.microsoft.com/office/drawing/2014/main" id="{992086D2-9EE1-93E2-C092-CC5FBE8314C8}"/>
+              </a:ext>
+            </a:extLst>
+          </p:cNvPr>
+          <p:cNvSpPr>
+            <a:spLocks noGrp="1"/>
+          </p:cNvSpPr>
+          <p:nvPr>
+            <p:ph type="ctrTitle"/>
+          </p:nvPr>
+        </p:nvSpPr>
+        <p:spPr>
+          <a:xfrm>
+            <a:off x="6151534" y="5385661"/>
+            <a:ext cx="5771829" cy="1270861"/>
+          </a:xfrm>
+        </p:spPr>
+        <p:txBody>
+          <a:bodyPr>
+            <a:normAutofit/>
+          </a:bodyPr>
+          <a:lstStyle/>
+          <a:p>
+            <a:pPr algn="l"/>
+            <a:r>
+              <a:rPr lang="ko-KR" altLang="en-US" sz="2000" dirty="0"/>
+              <a:t>미디어융합디자인공학</a:t>
+            </a:r>
+            <a:br>
+              <a:rPr lang="en-US" altLang="ko-KR" sz="2000" dirty="0"/>
+            </a:br>
+            <a:r>
+              <a:rPr lang="ko-KR" altLang="en-US" sz="2000" dirty="0"/>
+              <a:t>권재휘</a:t>
+            </a:r>
+            <a:br>
+              <a:rPr lang="en-US" altLang="ko-KR" sz="2000" dirty="0"/>
+            </a:br>
+            <a:r>
+              <a:rPr lang="en-US" altLang="ko-KR" sz="2000" dirty="0"/>
+              <a:t>kegedokoota@naver.com</a:t>
+            </a:r>
+            <a:endParaRPr lang="ko-KR" altLang="en-US" sz="2000" dirty="0"/>
+          </a:p>
+        </p:txBody>
+      </p:sp>
+      <p:sp>
+        <p:nvSpPr>
+          <p:cNvPr id="6" name="슬라이드 번호 개체 틀 5">
+            <a:extLst>
+              <a:ext uri="{FF2B5EF4-FFF2-40B4-BE49-F238E27FC236}">
+                <a16:creationId xmlns:a16="http://schemas.microsoft.com/office/drawing/2014/main" id="{64B06A81-EC34-D373-D70B-94C1F2ECF76C}"/>
+              </a:ext>
+            </a:extLst>
+          </p:cNvPr>
+          <p:cNvSpPr>
+            <a:spLocks noGrp="1"/>
+          </p:cNvSpPr>
+          <p:nvPr>
+            <p:ph type="sldNum" sz="quarter" idx="12"/>
+          </p:nvPr>
+        </p:nvSpPr>
+        <p:spPr/>
+        <p:txBody>
+          <a:bodyPr/>
+          <a:lstStyle/>
+          <a:p>
+            <a:fld id="{B5CEABB6-07DC-46E8-9B57-56EC44A396E5}" type="slidenum">
+              <a:rPr lang="en-US" altLang="ko-KR" noProof="0" smtClean="0"/>
+              <a:pPr/>
+              <a:t>8</a:t>
+            </a:fld>
+            <a:endParaRPr lang="ko-KR" altLang="en-US" noProof="0"/>
+          </a:p>
+        </p:txBody>
+      </p:sp>
+    </p:spTree>
+    <p:extLst>
+      <p:ext uri="{BB962C8B-B14F-4D97-AF65-F5344CB8AC3E}">
+        <p14:creationId xmlns:p14="http://schemas.microsoft.com/office/powerpoint/2010/main" val="3664621648"/>
       </p:ext>
     </p:extLst>
   </p:cSld>
@@ -13001,34 +13113,6 @@
 </file>
 
 <file path=customXml/item1.xml><?xml version="1.0" encoding="utf-8"?>
-<p:properties xmlns:p="http://schemas.microsoft.com/office/2006/metadata/properties" xmlns:xsi="http://www.w3.org/2001/XMLSchema-instance" xmlns:pc="http://schemas.microsoft.com/office/infopath/2007/PartnerControls">
-  <documentManagement>
-    <_ip_UnifiedCompliancePolicyUIAction xmlns="http://schemas.microsoft.com/sharepoint/v3" xsi:nil="true"/>
-    <Image xmlns="71af3243-3dd4-4a8d-8c0d-dd76da1f02a5">
-      <Url xsi:nil="true"/>
-      <Description xsi:nil="true"/>
-    </Image>
-    <Status xmlns="71af3243-3dd4-4a8d-8c0d-dd76da1f02a5">Not started</Status>
-    <_ip_UnifiedCompliancePolicyProperties xmlns="http://schemas.microsoft.com/sharepoint/v3" xsi:nil="true"/>
-    <ImageTagsTaxHTField xmlns="71af3243-3dd4-4a8d-8c0d-dd76da1f02a5">
-      <Terms xmlns="http://schemas.microsoft.com/office/infopath/2007/PartnerControls"/>
-    </ImageTagsTaxHTField>
-    <TaxCatchAll xmlns="230e9df3-be65-4c73-a93b-d1236ebd677e"/>
-    <MediaServiceKeyPoints xmlns="71af3243-3dd4-4a8d-8c0d-dd76da1f02a5" xsi:nil="true"/>
-  </documentManagement>
-</p:properties>
-</file>
-
-<file path=customXml/item2.xml><?xml version="1.0" encoding="utf-8"?>
-<?mso-contentType ?>
-<FormTemplates xmlns="http://schemas.microsoft.com/sharepoint/v3/contenttype/forms">
-  <Display>DocumentLibraryForm</Display>
-  <Edit>DocumentLibraryForm</Edit>
-  <New>DocumentLibraryForm</New>
-</FormTemplates>
-</file>
-
-<file path=customXml/item3.xml><?xml version="1.0" encoding="utf-8"?>
 <ct:contentTypeSchema xmlns:ct="http://schemas.microsoft.com/office/2006/metadata/contentType" xmlns:ma="http://schemas.microsoft.com/office/2006/metadata/properties/metaAttributes" ct:_="" ma:_="" ma:contentTypeName="Document" ma:contentTypeID="0x01010079F111ED35F8CC479449609E8A0923A6" ma:contentTypeVersion="21" ma:contentTypeDescription="Create a new document." ma:contentTypeScope="" ma:versionID="64dfb1555687e0874b4304b796b5b0c7">
   <xsd:schema xmlns:xsd="http://www.w3.org/2001/XMLSchema" xmlns:xs="http://www.w3.org/2001/XMLSchema" xmlns:p="http://schemas.microsoft.com/office/2006/metadata/properties" xmlns:ns1="http://schemas.microsoft.com/sharepoint/v3" xmlns:ns2="71af3243-3dd4-4a8d-8c0d-dd76da1f02a5" xmlns:ns3="16c05727-aa75-4e4a-9b5f-8a80a1165891" xmlns:ns4="230e9df3-be65-4c73-a93b-d1236ebd677e" targetNamespace="http://schemas.microsoft.com/office/2006/metadata/properties" ma:root="true" ma:fieldsID="e6e4c555b5e194d05b7203de9c4567b3" ns1:_="" ns2:_="" ns3:_="" ns4:_="">
     <xsd:import namespace="http://schemas.microsoft.com/sharepoint/v3"/>
@@ -13310,27 +13394,35 @@
 </ct:contentTypeSchema>
 </file>
 
-<file path=customXml/itemProps1.xml><?xml version="1.0" encoding="utf-8"?>
-<ds:datastoreItem xmlns:ds="http://schemas.openxmlformats.org/officeDocument/2006/customXml" ds:itemID="{CA4F7154-AFAC-4BE7-8A74-7F4B6FC2743C}">
-  <ds:schemaRefs>
-    <ds:schemaRef ds:uri="http://schemas.microsoft.com/office/2006/metadata/properties"/>
-    <ds:schemaRef ds:uri="http://schemas.microsoft.com/office/infopath/2007/PartnerControls"/>
-    <ds:schemaRef ds:uri="http://schemas.microsoft.com/sharepoint/v3"/>
-    <ds:schemaRef ds:uri="71af3243-3dd4-4a8d-8c0d-dd76da1f02a5"/>
-    <ds:schemaRef ds:uri="230e9df3-be65-4c73-a93b-d1236ebd677e"/>
-  </ds:schemaRefs>
-</ds:datastoreItem>
+<file path=customXml/item2.xml><?xml version="1.0" encoding="utf-8"?>
+<?mso-contentType ?>
+<FormTemplates xmlns="http://schemas.microsoft.com/sharepoint/v3/contenttype/forms">
+  <Display>DocumentLibraryForm</Display>
+  <Edit>DocumentLibraryForm</Edit>
+  <New>DocumentLibraryForm</New>
+</FormTemplates>
 </file>
 
-<file path=customXml/itemProps2.xml><?xml version="1.0" encoding="utf-8"?>
-<ds:datastoreItem xmlns:ds="http://schemas.openxmlformats.org/officeDocument/2006/customXml" ds:itemID="{E618C13B-9D83-4AF4-B64D-33362D5133F8}">
-  <ds:schemaRefs>
-    <ds:schemaRef ds:uri="http://schemas.microsoft.com/sharepoint/v3/contenttype/forms"/>
-  </ds:schemaRefs>
-</ds:datastoreItem>
+<file path=customXml/item3.xml><?xml version="1.0" encoding="utf-8"?>
+<p:properties xmlns:p="http://schemas.microsoft.com/office/2006/metadata/properties" xmlns:xsi="http://www.w3.org/2001/XMLSchema-instance" xmlns:pc="http://schemas.microsoft.com/office/infopath/2007/PartnerControls">
+  <documentManagement>
+    <_ip_UnifiedCompliancePolicyUIAction xmlns="http://schemas.microsoft.com/sharepoint/v3" xsi:nil="true"/>
+    <Image xmlns="71af3243-3dd4-4a8d-8c0d-dd76da1f02a5">
+      <Url xsi:nil="true"/>
+      <Description xsi:nil="true"/>
+    </Image>
+    <Status xmlns="71af3243-3dd4-4a8d-8c0d-dd76da1f02a5">Not started</Status>
+    <_ip_UnifiedCompliancePolicyProperties xmlns="http://schemas.microsoft.com/sharepoint/v3" xsi:nil="true"/>
+    <ImageTagsTaxHTField xmlns="71af3243-3dd4-4a8d-8c0d-dd76da1f02a5">
+      <Terms xmlns="http://schemas.microsoft.com/office/infopath/2007/PartnerControls"/>
+    </ImageTagsTaxHTField>
+    <TaxCatchAll xmlns="230e9df3-be65-4c73-a93b-d1236ebd677e"/>
+    <MediaServiceKeyPoints xmlns="71af3243-3dd4-4a8d-8c0d-dd76da1f02a5" xsi:nil="true"/>
+  </documentManagement>
+</p:properties>
 </file>
 
-<file path=customXml/itemProps3.xml><?xml version="1.0" encoding="utf-8"?>
+<file path=customXml/itemProps1.xml><?xml version="1.0" encoding="utf-8"?>
 <ds:datastoreItem xmlns:ds="http://schemas.openxmlformats.org/officeDocument/2006/customXml" ds:itemID="{67ACD96E-49A0-4DA4-A7BB-AC2D8874213F}">
   <ds:schemaRefs>
     <ds:schemaRef ds:uri="http://schemas.microsoft.com/office/2006/metadata/contentType"/>
@@ -13351,6 +13443,26 @@
 </ds:datastoreItem>
 </file>
 
+<file path=customXml/itemProps2.xml><?xml version="1.0" encoding="utf-8"?>
+<ds:datastoreItem xmlns:ds="http://schemas.openxmlformats.org/officeDocument/2006/customXml" ds:itemID="{E618C13B-9D83-4AF4-B64D-33362D5133F8}">
+  <ds:schemaRefs>
+    <ds:schemaRef ds:uri="http://schemas.microsoft.com/sharepoint/v3/contenttype/forms"/>
+  </ds:schemaRefs>
+</ds:datastoreItem>
+</file>
+
+<file path=customXml/itemProps3.xml><?xml version="1.0" encoding="utf-8"?>
+<ds:datastoreItem xmlns:ds="http://schemas.openxmlformats.org/officeDocument/2006/customXml" ds:itemID="{CA4F7154-AFAC-4BE7-8A74-7F4B6FC2743C}">
+  <ds:schemaRefs>
+    <ds:schemaRef ds:uri="http://schemas.microsoft.com/office/2006/metadata/properties"/>
+    <ds:schemaRef ds:uri="http://schemas.microsoft.com/office/infopath/2007/PartnerControls"/>
+    <ds:schemaRef ds:uri="http://schemas.microsoft.com/sharepoint/v3"/>
+    <ds:schemaRef ds:uri="71af3243-3dd4-4a8d-8c0d-dd76da1f02a5"/>
+    <ds:schemaRef ds:uri="230e9df3-be65-4c73-a93b-d1236ebd677e"/>
+  </ds:schemaRefs>
+</ds:datastoreItem>
+</file>
+
 <file path=docMetadata/LabelInfo.xml><?xml version="1.0" encoding="utf-8"?>
 <clbl:labelList xmlns:clbl="http://schemas.microsoft.com/office/2020/mipLabelMetadata">
   <clbl:label id="{f42aa342-8706-4288-bd11-ebb85995028c}" enabled="1" method="Standard" siteId="{72f988bf-86f1-41af-91ab-2d7cd011db47}" removed="0"/>

</xml_diff>

<commit_message>
add head pose estimation tutorial
</commit_message>
<xml_diff>
--- a/Venv를 통한 가상 환경.pptx
+++ b/Venv를 통한 가상 환경.pptx
@@ -5,10 +5,10 @@
     <p:sldMasterId id="2147483648" r:id="rId4"/>
   </p:sldMasterIdLst>
   <p:notesMasterIdLst>
-    <p:notesMasterId r:id="rId13"/>
+    <p:notesMasterId r:id="rId12"/>
   </p:notesMasterIdLst>
   <p:handoutMasterIdLst>
-    <p:handoutMasterId r:id="rId14"/>
+    <p:handoutMasterId r:id="rId13"/>
   </p:handoutMasterIdLst>
   <p:sldIdLst>
     <p:sldId id="256" r:id="rId5"/>
@@ -18,7 +18,6 @@
     <p:sldId id="293" r:id="rId9"/>
     <p:sldId id="294" r:id="rId10"/>
     <p:sldId id="295" r:id="rId11"/>
-    <p:sldId id="296" r:id="rId12"/>
   </p:sldIdLst>
   <p:sldSz cx="12192000" cy="6858000"/>
   <p:notesSz cx="6858000" cy="9144000"/>
@@ -242,7 +241,7 @@
                 <a:latin typeface="맑은 고딕" panose="020B0503020000020004" pitchFamily="50" charset="-127"/>
                 <a:ea typeface="맑은 고딕" panose="020B0503020000020004" pitchFamily="50" charset="-127"/>
               </a:rPr>
-              <a:t>2023-03-10</a:t>
+              <a:t>2023-03-14</a:t>
             </a:fld>
             <a:endParaRPr lang="ko-KR" altLang="en-US">
               <a:latin typeface="맑은 고딕" panose="020B0503020000020004" pitchFamily="50" charset="-127"/>
@@ -442,7 +441,7 @@
           <a:p>
             <a:fld id="{CB7534D4-AC06-4646-843F-0CC7DACE20EC}" type="datetime1">
               <a:rPr lang="ko-KR" altLang="en-US" noProof="0" smtClean="0"/>
-              <a:t>2023-03-10</a:t>
+              <a:t>2023-03-14</a:t>
             </a:fld>
             <a:endParaRPr lang="ko-KR" altLang="en-US" noProof="0">
               <a:latin typeface="맑은 고딕" panose="020B0503020000020004" pitchFamily="50" charset="-127"/>
@@ -12201,117 +12200,6 @@
     <p:extLst>
       <p:ext uri="{BB962C8B-B14F-4D97-AF65-F5344CB8AC3E}">
         <p14:creationId xmlns:p14="http://schemas.microsoft.com/office/powerpoint/2010/main" val="1053728518"/>
-      </p:ext>
-    </p:extLst>
-  </p:cSld>
-  <p:clrMapOvr>
-    <a:masterClrMapping/>
-  </p:clrMapOvr>
-</p:sld>
-</file>
-
-<file path=ppt/slides/slide8.xml><?xml version="1.0" encoding="utf-8"?>
-<p:sld xmlns:a="http://schemas.openxmlformats.org/drawingml/2006/main" xmlns:r="http://schemas.openxmlformats.org/officeDocument/2006/relationships" xmlns:p="http://schemas.openxmlformats.org/presentationml/2006/main">
-  <p:cSld>
-    <p:spTree>
-      <p:nvGrpSpPr>
-        <p:cNvPr id="1" name=""/>
-        <p:cNvGrpSpPr/>
-        <p:nvPr/>
-      </p:nvGrpSpPr>
-      <p:grpSpPr>
-        <a:xfrm>
-          <a:off x="0" y="0"/>
-          <a:ext cx="0" cy="0"/>
-          <a:chOff x="0" y="0"/>
-          <a:chExt cx="0" cy="0"/>
-        </a:xfrm>
-      </p:grpSpPr>
-      <p:sp>
-        <p:nvSpPr>
-          <p:cNvPr id="2" name="제목 1">
-            <a:extLst>
-              <a:ext uri="{FF2B5EF4-FFF2-40B4-BE49-F238E27FC236}">
-                <a16:creationId xmlns:a16="http://schemas.microsoft.com/office/drawing/2014/main" id="{992086D2-9EE1-93E2-C092-CC5FBE8314C8}"/>
-              </a:ext>
-            </a:extLst>
-          </p:cNvPr>
-          <p:cNvSpPr>
-            <a:spLocks noGrp="1"/>
-          </p:cNvSpPr>
-          <p:nvPr>
-            <p:ph type="ctrTitle"/>
-          </p:nvPr>
-        </p:nvSpPr>
-        <p:spPr>
-          <a:xfrm>
-            <a:off x="6151534" y="5385661"/>
-            <a:ext cx="5771829" cy="1270861"/>
-          </a:xfrm>
-        </p:spPr>
-        <p:txBody>
-          <a:bodyPr>
-            <a:normAutofit/>
-          </a:bodyPr>
-          <a:lstStyle/>
-          <a:p>
-            <a:pPr algn="l"/>
-            <a:r>
-              <a:rPr lang="ko-KR" altLang="en-US" sz="2000" dirty="0"/>
-              <a:t>미디어융합디자인공학</a:t>
-            </a:r>
-            <a:br>
-              <a:rPr lang="en-US" altLang="ko-KR" sz="2000" dirty="0"/>
-            </a:br>
-            <a:r>
-              <a:rPr lang="ko-KR" altLang="en-US" sz="2000" dirty="0"/>
-              <a:t>권재휘</a:t>
-            </a:r>
-            <a:br>
-              <a:rPr lang="en-US" altLang="ko-KR" sz="2000" dirty="0"/>
-            </a:br>
-            <a:r>
-              <a:rPr lang="en-US" altLang="ko-KR" sz="2000" dirty="0"/>
-              <a:t>kegedokoota@naver.com</a:t>
-            </a:r>
-            <a:endParaRPr lang="ko-KR" altLang="en-US" sz="2000" dirty="0"/>
-          </a:p>
-        </p:txBody>
-      </p:sp>
-      <p:sp>
-        <p:nvSpPr>
-          <p:cNvPr id="6" name="슬라이드 번호 개체 틀 5">
-            <a:extLst>
-              <a:ext uri="{FF2B5EF4-FFF2-40B4-BE49-F238E27FC236}">
-                <a16:creationId xmlns:a16="http://schemas.microsoft.com/office/drawing/2014/main" id="{64B06A81-EC34-D373-D70B-94C1F2ECF76C}"/>
-              </a:ext>
-            </a:extLst>
-          </p:cNvPr>
-          <p:cNvSpPr>
-            <a:spLocks noGrp="1"/>
-          </p:cNvSpPr>
-          <p:nvPr>
-            <p:ph type="sldNum" sz="quarter" idx="12"/>
-          </p:nvPr>
-        </p:nvSpPr>
-        <p:spPr/>
-        <p:txBody>
-          <a:bodyPr/>
-          <a:lstStyle/>
-          <a:p>
-            <a:fld id="{B5CEABB6-07DC-46E8-9B57-56EC44A396E5}" type="slidenum">
-              <a:rPr lang="en-US" altLang="ko-KR" noProof="0" smtClean="0"/>
-              <a:pPr/>
-              <a:t>8</a:t>
-            </a:fld>
-            <a:endParaRPr lang="ko-KR" altLang="en-US" noProof="0"/>
-          </a:p>
-        </p:txBody>
-      </p:sp>
-    </p:spTree>
-    <p:extLst>
-      <p:ext uri="{BB962C8B-B14F-4D97-AF65-F5344CB8AC3E}">
-        <p14:creationId xmlns:p14="http://schemas.microsoft.com/office/powerpoint/2010/main" val="3664621648"/>
       </p:ext>
     </p:extLst>
   </p:cSld>
@@ -13113,6 +13001,34 @@
 </file>
 
 <file path=customXml/item1.xml><?xml version="1.0" encoding="utf-8"?>
+<p:properties xmlns:p="http://schemas.microsoft.com/office/2006/metadata/properties" xmlns:xsi="http://www.w3.org/2001/XMLSchema-instance" xmlns:pc="http://schemas.microsoft.com/office/infopath/2007/PartnerControls">
+  <documentManagement>
+    <_ip_UnifiedCompliancePolicyUIAction xmlns="http://schemas.microsoft.com/sharepoint/v3" xsi:nil="true"/>
+    <Image xmlns="71af3243-3dd4-4a8d-8c0d-dd76da1f02a5">
+      <Url xsi:nil="true"/>
+      <Description xsi:nil="true"/>
+    </Image>
+    <Status xmlns="71af3243-3dd4-4a8d-8c0d-dd76da1f02a5">Not started</Status>
+    <_ip_UnifiedCompliancePolicyProperties xmlns="http://schemas.microsoft.com/sharepoint/v3" xsi:nil="true"/>
+    <ImageTagsTaxHTField xmlns="71af3243-3dd4-4a8d-8c0d-dd76da1f02a5">
+      <Terms xmlns="http://schemas.microsoft.com/office/infopath/2007/PartnerControls"/>
+    </ImageTagsTaxHTField>
+    <TaxCatchAll xmlns="230e9df3-be65-4c73-a93b-d1236ebd677e"/>
+    <MediaServiceKeyPoints xmlns="71af3243-3dd4-4a8d-8c0d-dd76da1f02a5" xsi:nil="true"/>
+  </documentManagement>
+</p:properties>
+</file>
+
+<file path=customXml/item2.xml><?xml version="1.0" encoding="utf-8"?>
+<?mso-contentType ?>
+<FormTemplates xmlns="http://schemas.microsoft.com/sharepoint/v3/contenttype/forms">
+  <Display>DocumentLibraryForm</Display>
+  <Edit>DocumentLibraryForm</Edit>
+  <New>DocumentLibraryForm</New>
+</FormTemplates>
+</file>
+
+<file path=customXml/item3.xml><?xml version="1.0" encoding="utf-8"?>
 <ct:contentTypeSchema xmlns:ct="http://schemas.microsoft.com/office/2006/metadata/contentType" xmlns:ma="http://schemas.microsoft.com/office/2006/metadata/properties/metaAttributes" ct:_="" ma:_="" ma:contentTypeName="Document" ma:contentTypeID="0x01010079F111ED35F8CC479449609E8A0923A6" ma:contentTypeVersion="21" ma:contentTypeDescription="Create a new document." ma:contentTypeScope="" ma:versionID="64dfb1555687e0874b4304b796b5b0c7">
   <xsd:schema xmlns:xsd="http://www.w3.org/2001/XMLSchema" xmlns:xs="http://www.w3.org/2001/XMLSchema" xmlns:p="http://schemas.microsoft.com/office/2006/metadata/properties" xmlns:ns1="http://schemas.microsoft.com/sharepoint/v3" xmlns:ns2="71af3243-3dd4-4a8d-8c0d-dd76da1f02a5" xmlns:ns3="16c05727-aa75-4e4a-9b5f-8a80a1165891" xmlns:ns4="230e9df3-be65-4c73-a93b-d1236ebd677e" targetNamespace="http://schemas.microsoft.com/office/2006/metadata/properties" ma:root="true" ma:fieldsID="e6e4c555b5e194d05b7203de9c4567b3" ns1:_="" ns2:_="" ns3:_="" ns4:_="">
     <xsd:import namespace="http://schemas.microsoft.com/sharepoint/v3"/>
@@ -13394,35 +13310,27 @@
 </ct:contentTypeSchema>
 </file>
 
-<file path=customXml/item2.xml><?xml version="1.0" encoding="utf-8"?>
-<?mso-contentType ?>
-<FormTemplates xmlns="http://schemas.microsoft.com/sharepoint/v3/contenttype/forms">
-  <Display>DocumentLibraryForm</Display>
-  <Edit>DocumentLibraryForm</Edit>
-  <New>DocumentLibraryForm</New>
-</FormTemplates>
+<file path=customXml/itemProps1.xml><?xml version="1.0" encoding="utf-8"?>
+<ds:datastoreItem xmlns:ds="http://schemas.openxmlformats.org/officeDocument/2006/customXml" ds:itemID="{CA4F7154-AFAC-4BE7-8A74-7F4B6FC2743C}">
+  <ds:schemaRefs>
+    <ds:schemaRef ds:uri="http://schemas.microsoft.com/office/2006/metadata/properties"/>
+    <ds:schemaRef ds:uri="http://schemas.microsoft.com/office/infopath/2007/PartnerControls"/>
+    <ds:schemaRef ds:uri="http://schemas.microsoft.com/sharepoint/v3"/>
+    <ds:schemaRef ds:uri="71af3243-3dd4-4a8d-8c0d-dd76da1f02a5"/>
+    <ds:schemaRef ds:uri="230e9df3-be65-4c73-a93b-d1236ebd677e"/>
+  </ds:schemaRefs>
+</ds:datastoreItem>
 </file>
 
-<file path=customXml/item3.xml><?xml version="1.0" encoding="utf-8"?>
-<p:properties xmlns:p="http://schemas.microsoft.com/office/2006/metadata/properties" xmlns:xsi="http://www.w3.org/2001/XMLSchema-instance" xmlns:pc="http://schemas.microsoft.com/office/infopath/2007/PartnerControls">
-  <documentManagement>
-    <_ip_UnifiedCompliancePolicyUIAction xmlns="http://schemas.microsoft.com/sharepoint/v3" xsi:nil="true"/>
-    <Image xmlns="71af3243-3dd4-4a8d-8c0d-dd76da1f02a5">
-      <Url xsi:nil="true"/>
-      <Description xsi:nil="true"/>
-    </Image>
-    <Status xmlns="71af3243-3dd4-4a8d-8c0d-dd76da1f02a5">Not started</Status>
-    <_ip_UnifiedCompliancePolicyProperties xmlns="http://schemas.microsoft.com/sharepoint/v3" xsi:nil="true"/>
-    <ImageTagsTaxHTField xmlns="71af3243-3dd4-4a8d-8c0d-dd76da1f02a5">
-      <Terms xmlns="http://schemas.microsoft.com/office/infopath/2007/PartnerControls"/>
-    </ImageTagsTaxHTField>
-    <TaxCatchAll xmlns="230e9df3-be65-4c73-a93b-d1236ebd677e"/>
-    <MediaServiceKeyPoints xmlns="71af3243-3dd4-4a8d-8c0d-dd76da1f02a5" xsi:nil="true"/>
-  </documentManagement>
-</p:properties>
+<file path=customXml/itemProps2.xml><?xml version="1.0" encoding="utf-8"?>
+<ds:datastoreItem xmlns:ds="http://schemas.openxmlformats.org/officeDocument/2006/customXml" ds:itemID="{E618C13B-9D83-4AF4-B64D-33362D5133F8}">
+  <ds:schemaRefs>
+    <ds:schemaRef ds:uri="http://schemas.microsoft.com/sharepoint/v3/contenttype/forms"/>
+  </ds:schemaRefs>
+</ds:datastoreItem>
 </file>
 
-<file path=customXml/itemProps1.xml><?xml version="1.0" encoding="utf-8"?>
+<file path=customXml/itemProps3.xml><?xml version="1.0" encoding="utf-8"?>
 <ds:datastoreItem xmlns:ds="http://schemas.openxmlformats.org/officeDocument/2006/customXml" ds:itemID="{67ACD96E-49A0-4DA4-A7BB-AC2D8874213F}">
   <ds:schemaRefs>
     <ds:schemaRef ds:uri="http://schemas.microsoft.com/office/2006/metadata/contentType"/>
@@ -13443,26 +13351,6 @@
 </ds:datastoreItem>
 </file>
 
-<file path=customXml/itemProps2.xml><?xml version="1.0" encoding="utf-8"?>
-<ds:datastoreItem xmlns:ds="http://schemas.openxmlformats.org/officeDocument/2006/customXml" ds:itemID="{E618C13B-9D83-4AF4-B64D-33362D5133F8}">
-  <ds:schemaRefs>
-    <ds:schemaRef ds:uri="http://schemas.microsoft.com/sharepoint/v3/contenttype/forms"/>
-  </ds:schemaRefs>
-</ds:datastoreItem>
-</file>
-
-<file path=customXml/itemProps3.xml><?xml version="1.0" encoding="utf-8"?>
-<ds:datastoreItem xmlns:ds="http://schemas.openxmlformats.org/officeDocument/2006/customXml" ds:itemID="{CA4F7154-AFAC-4BE7-8A74-7F4B6FC2743C}">
-  <ds:schemaRefs>
-    <ds:schemaRef ds:uri="http://schemas.microsoft.com/office/2006/metadata/properties"/>
-    <ds:schemaRef ds:uri="http://schemas.microsoft.com/office/infopath/2007/PartnerControls"/>
-    <ds:schemaRef ds:uri="http://schemas.microsoft.com/sharepoint/v3"/>
-    <ds:schemaRef ds:uri="71af3243-3dd4-4a8d-8c0d-dd76da1f02a5"/>
-    <ds:schemaRef ds:uri="230e9df3-be65-4c73-a93b-d1236ebd677e"/>
-  </ds:schemaRefs>
-</ds:datastoreItem>
-</file>
-
 <file path=docMetadata/LabelInfo.xml><?xml version="1.0" encoding="utf-8"?>
 <clbl:labelList xmlns:clbl="http://schemas.microsoft.com/office/2020/mipLabelMetadata">
   <clbl:label id="{f42aa342-8706-4288-bd11-ebb85995028c}" enabled="1" method="Standard" siteId="{72f988bf-86f1-41af-91ab-2d7cd011db47}" removed="0"/>

</xml_diff>